<commit_message>
Con el doc terminado
</commit_message>
<xml_diff>
--- a/Dibujos.pptx
+++ b/Dibujos.pptx
@@ -6,6 +6,7 @@
   </p:sldMasterIdLst>
   <p:sldIdLst>
     <p:sldId id="256" r:id="rId2"/>
+    <p:sldId id="257" r:id="rId3"/>
   </p:sldIdLst>
   <p:sldSz cx="12192000" cy="6858000"/>
   <p:notesSz cx="6858000" cy="9144000"/>
@@ -104,6 +105,11 @@
       </a:defRPr>
     </a:lvl9pPr>
   </p:defaultTextStyle>
+  <p:extLst>
+    <p:ext uri="{EFAFB233-063F-42B5-8137-9DF3F51BA10A}">
+      <p15:sldGuideLst xmlns:p15="http://schemas.microsoft.com/office/powerpoint/2012/main"/>
+    </p:ext>
+  </p:extLst>
 </p:presentation>
 </file>
 
@@ -254,7 +260,7 @@
           <a:p>
             <a:fld id="{9C6A964C-A5C1-43B4-BAFC-3CF9C5E1DF85}" type="datetimeFigureOut">
               <a:rPr lang="es-ES" smtClean="0"/>
-              <a:t>14/07/2022</a:t>
+              <a:t>16/07/2022</a:t>
             </a:fld>
             <a:endParaRPr lang="es-ES"/>
           </a:p>
@@ -452,7 +458,7 @@
           <a:p>
             <a:fld id="{9C6A964C-A5C1-43B4-BAFC-3CF9C5E1DF85}" type="datetimeFigureOut">
               <a:rPr lang="es-ES" smtClean="0"/>
-              <a:t>14/07/2022</a:t>
+              <a:t>16/07/2022</a:t>
             </a:fld>
             <a:endParaRPr lang="es-ES"/>
           </a:p>
@@ -660,7 +666,7 @@
           <a:p>
             <a:fld id="{9C6A964C-A5C1-43B4-BAFC-3CF9C5E1DF85}" type="datetimeFigureOut">
               <a:rPr lang="es-ES" smtClean="0"/>
-              <a:t>14/07/2022</a:t>
+              <a:t>16/07/2022</a:t>
             </a:fld>
             <a:endParaRPr lang="es-ES"/>
           </a:p>
@@ -858,7 +864,7 @@
           <a:p>
             <a:fld id="{9C6A964C-A5C1-43B4-BAFC-3CF9C5E1DF85}" type="datetimeFigureOut">
               <a:rPr lang="es-ES" smtClean="0"/>
-              <a:t>14/07/2022</a:t>
+              <a:t>16/07/2022</a:t>
             </a:fld>
             <a:endParaRPr lang="es-ES"/>
           </a:p>
@@ -1133,7 +1139,7 @@
           <a:p>
             <a:fld id="{9C6A964C-A5C1-43B4-BAFC-3CF9C5E1DF85}" type="datetimeFigureOut">
               <a:rPr lang="es-ES" smtClean="0"/>
-              <a:t>14/07/2022</a:t>
+              <a:t>16/07/2022</a:t>
             </a:fld>
             <a:endParaRPr lang="es-ES"/>
           </a:p>
@@ -1398,7 +1404,7 @@
           <a:p>
             <a:fld id="{9C6A964C-A5C1-43B4-BAFC-3CF9C5E1DF85}" type="datetimeFigureOut">
               <a:rPr lang="es-ES" smtClean="0"/>
-              <a:t>14/07/2022</a:t>
+              <a:t>16/07/2022</a:t>
             </a:fld>
             <a:endParaRPr lang="es-ES"/>
           </a:p>
@@ -1810,7 +1816,7 @@
           <a:p>
             <a:fld id="{9C6A964C-A5C1-43B4-BAFC-3CF9C5E1DF85}" type="datetimeFigureOut">
               <a:rPr lang="es-ES" smtClean="0"/>
-              <a:t>14/07/2022</a:t>
+              <a:t>16/07/2022</a:t>
             </a:fld>
             <a:endParaRPr lang="es-ES"/>
           </a:p>
@@ -1951,7 +1957,7 @@
           <a:p>
             <a:fld id="{9C6A964C-A5C1-43B4-BAFC-3CF9C5E1DF85}" type="datetimeFigureOut">
               <a:rPr lang="es-ES" smtClean="0"/>
-              <a:t>14/07/2022</a:t>
+              <a:t>16/07/2022</a:t>
             </a:fld>
             <a:endParaRPr lang="es-ES"/>
           </a:p>
@@ -2064,7 +2070,7 @@
           <a:p>
             <a:fld id="{9C6A964C-A5C1-43B4-BAFC-3CF9C5E1DF85}" type="datetimeFigureOut">
               <a:rPr lang="es-ES" smtClean="0"/>
-              <a:t>14/07/2022</a:t>
+              <a:t>16/07/2022</a:t>
             </a:fld>
             <a:endParaRPr lang="es-ES"/>
           </a:p>
@@ -2375,7 +2381,7 @@
           <a:p>
             <a:fld id="{9C6A964C-A5C1-43B4-BAFC-3CF9C5E1DF85}" type="datetimeFigureOut">
               <a:rPr lang="es-ES" smtClean="0"/>
-              <a:t>14/07/2022</a:t>
+              <a:t>16/07/2022</a:t>
             </a:fld>
             <a:endParaRPr lang="es-ES"/>
           </a:p>
@@ -2663,7 +2669,7 @@
           <a:p>
             <a:fld id="{9C6A964C-A5C1-43B4-BAFC-3CF9C5E1DF85}" type="datetimeFigureOut">
               <a:rPr lang="es-ES" smtClean="0"/>
-              <a:t>14/07/2022</a:t>
+              <a:t>16/07/2022</a:t>
             </a:fld>
             <a:endParaRPr lang="es-ES"/>
           </a:p>
@@ -2904,7 +2910,7 @@
           <a:p>
             <a:fld id="{9C6A964C-A5C1-43B4-BAFC-3CF9C5E1DF85}" type="datetimeFigureOut">
               <a:rPr lang="es-ES" smtClean="0"/>
-              <a:t>14/07/2022</a:t>
+              <a:t>16/07/2022</a:t>
             </a:fld>
             <a:endParaRPr lang="es-ES"/>
           </a:p>
@@ -4374,6 +4380,469 @@
 </p:sld>
 </file>
 
+<file path=ppt/slides/slide2.xml><?xml version="1.0" encoding="utf-8"?>
+<p:sld xmlns:a="http://schemas.openxmlformats.org/drawingml/2006/main" xmlns:r="http://schemas.openxmlformats.org/officeDocument/2006/relationships" xmlns:p="http://schemas.openxmlformats.org/presentationml/2006/main">
+  <p:cSld>
+    <p:spTree>
+      <p:nvGrpSpPr>
+        <p:cNvPr id="1" name=""/>
+        <p:cNvGrpSpPr/>
+        <p:nvPr/>
+      </p:nvGrpSpPr>
+      <p:grpSpPr>
+        <a:xfrm>
+          <a:off x="0" y="0"/>
+          <a:ext cx="0" cy="0"/>
+          <a:chOff x="0" y="0"/>
+          <a:chExt cx="0" cy="0"/>
+        </a:xfrm>
+      </p:grpSpPr>
+      <p:sp>
+        <p:nvSpPr>
+          <p:cNvPr id="2" name="Cara sonriente 1">
+            <a:extLst>
+              <a:ext uri="{FF2B5EF4-FFF2-40B4-BE49-F238E27FC236}">
+                <a16:creationId xmlns:a16="http://schemas.microsoft.com/office/drawing/2014/main" id="{3BE954F8-69D7-9AEB-B465-9C544CAA2ED7}"/>
+              </a:ext>
+            </a:extLst>
+          </p:cNvPr>
+          <p:cNvSpPr/>
+          <p:nvPr/>
+        </p:nvSpPr>
+        <p:spPr>
+          <a:xfrm>
+            <a:off x="215899" y="3052232"/>
+            <a:ext cx="524934" cy="474133"/>
+          </a:xfrm>
+          <a:prstGeom prst="smileyFace">
+            <a:avLst/>
+          </a:prstGeom>
+        </p:spPr>
+        <p:style>
+          <a:lnRef idx="2">
+            <a:schemeClr val="accent1">
+              <a:shade val="50000"/>
+            </a:schemeClr>
+          </a:lnRef>
+          <a:fillRef idx="1">
+            <a:schemeClr val="accent1"/>
+          </a:fillRef>
+          <a:effectRef idx="0">
+            <a:schemeClr val="accent1"/>
+          </a:effectRef>
+          <a:fontRef idx="minor">
+            <a:schemeClr val="lt1"/>
+          </a:fontRef>
+        </p:style>
+        <p:txBody>
+          <a:bodyPr rtlCol="0" anchor="ctr"/>
+          <a:lstStyle/>
+          <a:p>
+            <a:pPr algn="ctr"/>
+            <a:endParaRPr lang="es-ES"/>
+          </a:p>
+        </p:txBody>
+      </p:sp>
+      <p:sp>
+        <p:nvSpPr>
+          <p:cNvPr id="3" name="Rectángulo 2">
+            <a:extLst>
+              <a:ext uri="{FF2B5EF4-FFF2-40B4-BE49-F238E27FC236}">
+                <a16:creationId xmlns:a16="http://schemas.microsoft.com/office/drawing/2014/main" id="{37AB2C1B-D7B4-63DB-9B55-916310949A27}"/>
+              </a:ext>
+            </a:extLst>
+          </p:cNvPr>
+          <p:cNvSpPr/>
+          <p:nvPr/>
+        </p:nvSpPr>
+        <p:spPr>
+          <a:xfrm>
+            <a:off x="1617133" y="2874432"/>
+            <a:ext cx="1828800" cy="829734"/>
+          </a:xfrm>
+          <a:prstGeom prst="rect">
+            <a:avLst/>
+          </a:prstGeom>
+        </p:spPr>
+        <p:style>
+          <a:lnRef idx="2">
+            <a:schemeClr val="accent1">
+              <a:shade val="50000"/>
+            </a:schemeClr>
+          </a:lnRef>
+          <a:fillRef idx="1">
+            <a:schemeClr val="accent1"/>
+          </a:fillRef>
+          <a:effectRef idx="0">
+            <a:schemeClr val="accent1"/>
+          </a:effectRef>
+          <a:fontRef idx="minor">
+            <a:schemeClr val="lt1"/>
+          </a:fontRef>
+        </p:style>
+        <p:txBody>
+          <a:bodyPr rtlCol="0" anchor="ctr"/>
+          <a:lstStyle/>
+          <a:p>
+            <a:pPr algn="ctr"/>
+            <a:r>
+              <a:rPr lang="es-ES" dirty="0" err="1"/>
+              <a:t>Ingress</a:t>
+            </a:r>
+            <a:r>
+              <a:rPr lang="es-ES" dirty="0"/>
+              <a:t> </a:t>
+            </a:r>
+            <a:r>
+              <a:rPr lang="es-ES" dirty="0" err="1"/>
+              <a:t>Controller</a:t>
+            </a:r>
+            <a:r>
+              <a:rPr lang="es-ES" dirty="0"/>
+              <a:t> </a:t>
+            </a:r>
+          </a:p>
+        </p:txBody>
+      </p:sp>
+      <p:sp>
+        <p:nvSpPr>
+          <p:cNvPr id="4" name="Rectángulo 3">
+            <a:extLst>
+              <a:ext uri="{FF2B5EF4-FFF2-40B4-BE49-F238E27FC236}">
+                <a16:creationId xmlns:a16="http://schemas.microsoft.com/office/drawing/2014/main" id="{D687C0B2-BB0E-B72E-8C44-8E1E78591A33}"/>
+              </a:ext>
+            </a:extLst>
+          </p:cNvPr>
+          <p:cNvSpPr/>
+          <p:nvPr/>
+        </p:nvSpPr>
+        <p:spPr>
+          <a:xfrm>
+            <a:off x="3966633" y="2840565"/>
+            <a:ext cx="2218267" cy="897467"/>
+          </a:xfrm>
+          <a:prstGeom prst="rect">
+            <a:avLst/>
+          </a:prstGeom>
+        </p:spPr>
+        <p:style>
+          <a:lnRef idx="2">
+            <a:schemeClr val="accent1">
+              <a:shade val="50000"/>
+            </a:schemeClr>
+          </a:lnRef>
+          <a:fillRef idx="1">
+            <a:schemeClr val="accent1"/>
+          </a:fillRef>
+          <a:effectRef idx="0">
+            <a:schemeClr val="accent1"/>
+          </a:effectRef>
+          <a:fontRef idx="minor">
+            <a:schemeClr val="lt1"/>
+          </a:fontRef>
+        </p:style>
+        <p:txBody>
+          <a:bodyPr rtlCol="0" anchor="ctr"/>
+          <a:lstStyle/>
+          <a:p>
+            <a:pPr algn="ctr"/>
+            <a:r>
+              <a:rPr lang="es-ES" dirty="0" err="1"/>
+              <a:t>Ingress</a:t>
+            </a:r>
+            <a:r>
+              <a:rPr lang="es-ES" dirty="0"/>
+              <a:t> Aplicación </a:t>
+            </a:r>
+          </a:p>
+        </p:txBody>
+      </p:sp>
+      <p:sp>
+        <p:nvSpPr>
+          <p:cNvPr id="5" name="Rectángulo 4">
+            <a:extLst>
+              <a:ext uri="{FF2B5EF4-FFF2-40B4-BE49-F238E27FC236}">
+                <a16:creationId xmlns:a16="http://schemas.microsoft.com/office/drawing/2014/main" id="{24E33019-14CE-7C31-321A-135394E9672D}"/>
+              </a:ext>
+            </a:extLst>
+          </p:cNvPr>
+          <p:cNvSpPr/>
+          <p:nvPr/>
+        </p:nvSpPr>
+        <p:spPr>
+          <a:xfrm>
+            <a:off x="7061200" y="1439332"/>
+            <a:ext cx="2218267" cy="3699935"/>
+          </a:xfrm>
+          <a:prstGeom prst="rect">
+            <a:avLst/>
+          </a:prstGeom>
+        </p:spPr>
+        <p:style>
+          <a:lnRef idx="2">
+            <a:schemeClr val="accent1">
+              <a:shade val="50000"/>
+            </a:schemeClr>
+          </a:lnRef>
+          <a:fillRef idx="1">
+            <a:schemeClr val="accent1"/>
+          </a:fillRef>
+          <a:effectRef idx="0">
+            <a:schemeClr val="accent1"/>
+          </a:effectRef>
+          <a:fontRef idx="minor">
+            <a:schemeClr val="lt1"/>
+          </a:fontRef>
+        </p:style>
+        <p:txBody>
+          <a:bodyPr rtlCol="0" anchor="t"/>
+          <a:lstStyle/>
+          <a:p>
+            <a:pPr algn="ctr"/>
+            <a:r>
+              <a:rPr lang="es-ES" dirty="0"/>
+              <a:t>Servicio </a:t>
+            </a:r>
+          </a:p>
+        </p:txBody>
+      </p:sp>
+      <p:sp>
+        <p:nvSpPr>
+          <p:cNvPr id="6" name="Rectángulo 5">
+            <a:extLst>
+              <a:ext uri="{FF2B5EF4-FFF2-40B4-BE49-F238E27FC236}">
+                <a16:creationId xmlns:a16="http://schemas.microsoft.com/office/drawing/2014/main" id="{AA18E64D-0A0C-E54D-2ED2-E7A897DF002E}"/>
+              </a:ext>
+            </a:extLst>
+          </p:cNvPr>
+          <p:cNvSpPr/>
+          <p:nvPr/>
+        </p:nvSpPr>
+        <p:spPr>
+          <a:xfrm>
+            <a:off x="7526867" y="2125133"/>
+            <a:ext cx="1363133" cy="829734"/>
+          </a:xfrm>
+          <a:prstGeom prst="rect">
+            <a:avLst/>
+          </a:prstGeom>
+        </p:spPr>
+        <p:style>
+          <a:lnRef idx="2">
+            <a:schemeClr val="accent2">
+              <a:shade val="50000"/>
+            </a:schemeClr>
+          </a:lnRef>
+          <a:fillRef idx="1">
+            <a:schemeClr val="accent2"/>
+          </a:fillRef>
+          <a:effectRef idx="0">
+            <a:schemeClr val="accent2"/>
+          </a:effectRef>
+          <a:fontRef idx="minor">
+            <a:schemeClr val="lt1"/>
+          </a:fontRef>
+        </p:style>
+        <p:txBody>
+          <a:bodyPr rtlCol="0" anchor="ctr"/>
+          <a:lstStyle/>
+          <a:p>
+            <a:pPr algn="ctr"/>
+            <a:r>
+              <a:rPr lang="es-ES" dirty="0"/>
+              <a:t>POD</a:t>
+            </a:r>
+          </a:p>
+        </p:txBody>
+      </p:sp>
+      <p:sp>
+        <p:nvSpPr>
+          <p:cNvPr id="7" name="Rectángulo 6">
+            <a:extLst>
+              <a:ext uri="{FF2B5EF4-FFF2-40B4-BE49-F238E27FC236}">
+                <a16:creationId xmlns:a16="http://schemas.microsoft.com/office/drawing/2014/main" id="{A6B1AB5E-D754-B6B6-8446-774CA76A8685}"/>
+              </a:ext>
+            </a:extLst>
+          </p:cNvPr>
+          <p:cNvSpPr/>
+          <p:nvPr/>
+        </p:nvSpPr>
+        <p:spPr>
+          <a:xfrm>
+            <a:off x="7586134" y="3632200"/>
+            <a:ext cx="1363133" cy="829734"/>
+          </a:xfrm>
+          <a:prstGeom prst="rect">
+            <a:avLst/>
+          </a:prstGeom>
+        </p:spPr>
+        <p:style>
+          <a:lnRef idx="2">
+            <a:schemeClr val="accent2">
+              <a:shade val="50000"/>
+            </a:schemeClr>
+          </a:lnRef>
+          <a:fillRef idx="1">
+            <a:schemeClr val="accent2"/>
+          </a:fillRef>
+          <a:effectRef idx="0">
+            <a:schemeClr val="accent2"/>
+          </a:effectRef>
+          <a:fontRef idx="minor">
+            <a:schemeClr val="lt1"/>
+          </a:fontRef>
+        </p:style>
+        <p:txBody>
+          <a:bodyPr rtlCol="0" anchor="ctr"/>
+          <a:lstStyle/>
+          <a:p>
+            <a:pPr algn="ctr"/>
+            <a:r>
+              <a:rPr lang="es-ES" dirty="0"/>
+              <a:t>POD</a:t>
+            </a:r>
+          </a:p>
+        </p:txBody>
+      </p:sp>
+      <p:cxnSp>
+        <p:nvCxnSpPr>
+          <p:cNvPr id="9" name="Conector recto de flecha 8">
+            <a:extLst>
+              <a:ext uri="{FF2B5EF4-FFF2-40B4-BE49-F238E27FC236}">
+                <a16:creationId xmlns:a16="http://schemas.microsoft.com/office/drawing/2014/main" id="{80FB983A-1A8C-C7E1-1B08-28C9FF744651}"/>
+              </a:ext>
+            </a:extLst>
+          </p:cNvPr>
+          <p:cNvCxnSpPr>
+            <a:stCxn id="2" idx="6"/>
+            <a:endCxn id="3" idx="1"/>
+          </p:cNvCxnSpPr>
+          <p:nvPr/>
+        </p:nvCxnSpPr>
+        <p:spPr>
+          <a:xfrm>
+            <a:off x="740833" y="3289299"/>
+            <a:ext cx="876300" cy="0"/>
+          </a:xfrm>
+          <a:prstGeom prst="straightConnector1">
+            <a:avLst/>
+          </a:prstGeom>
+          <a:ln>
+            <a:tailEnd type="triangle"/>
+          </a:ln>
+        </p:spPr>
+        <p:style>
+          <a:lnRef idx="1">
+            <a:schemeClr val="accent1"/>
+          </a:lnRef>
+          <a:fillRef idx="0">
+            <a:schemeClr val="accent1"/>
+          </a:fillRef>
+          <a:effectRef idx="0">
+            <a:schemeClr val="accent1"/>
+          </a:effectRef>
+          <a:fontRef idx="minor">
+            <a:schemeClr val="tx1"/>
+          </a:fontRef>
+        </p:style>
+      </p:cxnSp>
+      <p:cxnSp>
+        <p:nvCxnSpPr>
+          <p:cNvPr id="11" name="Conector recto de flecha 10">
+            <a:extLst>
+              <a:ext uri="{FF2B5EF4-FFF2-40B4-BE49-F238E27FC236}">
+                <a16:creationId xmlns:a16="http://schemas.microsoft.com/office/drawing/2014/main" id="{D3FF1AC3-EDAC-3DC4-7202-7629B8908B8E}"/>
+              </a:ext>
+            </a:extLst>
+          </p:cNvPr>
+          <p:cNvCxnSpPr>
+            <a:stCxn id="3" idx="3"/>
+            <a:endCxn id="4" idx="1"/>
+          </p:cNvCxnSpPr>
+          <p:nvPr/>
+        </p:nvCxnSpPr>
+        <p:spPr>
+          <a:xfrm>
+            <a:off x="3445933" y="3289299"/>
+            <a:ext cx="520700" cy="0"/>
+          </a:xfrm>
+          <a:prstGeom prst="straightConnector1">
+            <a:avLst/>
+          </a:prstGeom>
+          <a:ln>
+            <a:tailEnd type="triangle"/>
+          </a:ln>
+        </p:spPr>
+        <p:style>
+          <a:lnRef idx="1">
+            <a:schemeClr val="accent1"/>
+          </a:lnRef>
+          <a:fillRef idx="0">
+            <a:schemeClr val="accent1"/>
+          </a:fillRef>
+          <a:effectRef idx="0">
+            <a:schemeClr val="accent1"/>
+          </a:effectRef>
+          <a:fontRef idx="minor">
+            <a:schemeClr val="tx1"/>
+          </a:fontRef>
+        </p:style>
+      </p:cxnSp>
+      <p:cxnSp>
+        <p:nvCxnSpPr>
+          <p:cNvPr id="13" name="Conector recto de flecha 12">
+            <a:extLst>
+              <a:ext uri="{FF2B5EF4-FFF2-40B4-BE49-F238E27FC236}">
+                <a16:creationId xmlns:a16="http://schemas.microsoft.com/office/drawing/2014/main" id="{76FA1302-0EE2-05F3-BBFD-FB75D020D35C}"/>
+              </a:ext>
+            </a:extLst>
+          </p:cNvPr>
+          <p:cNvCxnSpPr>
+            <a:stCxn id="4" idx="3"/>
+            <a:endCxn id="5" idx="1"/>
+          </p:cNvCxnSpPr>
+          <p:nvPr/>
+        </p:nvCxnSpPr>
+        <p:spPr>
+          <a:xfrm>
+            <a:off x="6184900" y="3289299"/>
+            <a:ext cx="876300" cy="1"/>
+          </a:xfrm>
+          <a:prstGeom prst="straightConnector1">
+            <a:avLst/>
+          </a:prstGeom>
+          <a:ln>
+            <a:tailEnd type="triangle"/>
+          </a:ln>
+        </p:spPr>
+        <p:style>
+          <a:lnRef idx="1">
+            <a:schemeClr val="accent1"/>
+          </a:lnRef>
+          <a:fillRef idx="0">
+            <a:schemeClr val="accent1"/>
+          </a:fillRef>
+          <a:effectRef idx="0">
+            <a:schemeClr val="accent1"/>
+          </a:effectRef>
+          <a:fontRef idx="minor">
+            <a:schemeClr val="tx1"/>
+          </a:fontRef>
+        </p:style>
+      </p:cxnSp>
+    </p:spTree>
+    <p:extLst>
+      <p:ext uri="{BB962C8B-B14F-4D97-AF65-F5344CB8AC3E}">
+        <p14:creationId xmlns:p14="http://schemas.microsoft.com/office/powerpoint/2010/main" val="1290485650"/>
+      </p:ext>
+    </p:extLst>
+  </p:cSld>
+  <p:clrMapOvr>
+    <a:masterClrMapping/>
+  </p:clrMapOvr>
+</p:sld>
+</file>
+
 <file path=ppt/theme/theme1.xml><?xml version="1.0" encoding="utf-8"?>
 <a:theme xmlns:a="http://schemas.openxmlformats.org/drawingml/2006/main" name="Tema de Office">
   <a:themeElements>

</xml_diff>